<commit_message>
Fixed ordered in pptx
</commit_message>
<xml_diff>
--- a/progress/week2/week_2_progress.pptx
+++ b/progress/week2/week_2_progress.pptx
@@ -11,8 +11,8 @@
     <p:sldId id="259" r:id="rId5"/>
     <p:sldId id="260" r:id="rId6"/>
     <p:sldId id="261" r:id="rId7"/>
-    <p:sldId id="263" r:id="rId8"/>
-    <p:sldId id="262" r:id="rId9"/>
+    <p:sldId id="262" r:id="rId8"/>
+    <p:sldId id="263" r:id="rId9"/>
   </p:sldIdLst>
   <p:sldSz cx="12192000" cy="6858000"/>
   <p:notesSz cx="6858000" cy="9144000"/>
@@ -111,6 +111,11 @@
       </a:defRPr>
     </a:lvl9pPr>
   </p:defaultTextStyle>
+  <p:extLst>
+    <p:ext uri="{EFAFB233-063F-42B5-8137-9DF3F51BA10A}">
+      <p15:sldGuideLst xmlns:p15="http://schemas.microsoft.com/office/powerpoint/2012/main"/>
+    </p:ext>
+  </p:extLst>
 </p:presentation>
 </file>
 
@@ -6659,7 +6664,7 @@
           <p:cNvPr id="2" name="Title 1">
             <a:extLst>
               <a:ext uri="{FF2B5EF4-FFF2-40B4-BE49-F238E27FC236}">
-                <a16:creationId xmlns:a16="http://schemas.microsoft.com/office/drawing/2014/main" id="{B0D1E4A0-172B-4607-9710-FDB108DF0D86}"/>
+                <a16:creationId xmlns:a16="http://schemas.microsoft.com/office/drawing/2014/main" id="{AB535E06-EE70-48F2-841E-ECA1902D934C}"/>
               </a:ext>
             </a:extLst>
           </p:cNvPr>
@@ -6677,7 +6682,7 @@
           <a:p>
             <a:r>
               <a:rPr lang="en-US" dirty="0"/>
-              <a:t>Current Challenges	</a:t>
+              <a:t>Roles &amp; Responsibilities</a:t>
             </a:r>
           </a:p>
         </p:txBody>
@@ -6687,7 +6692,7 @@
           <p:cNvPr id="3" name="Content Placeholder 2">
             <a:extLst>
               <a:ext uri="{FF2B5EF4-FFF2-40B4-BE49-F238E27FC236}">
-                <a16:creationId xmlns:a16="http://schemas.microsoft.com/office/drawing/2014/main" id="{9923A74C-6298-4F1F-B35F-5424FE296686}"/>
+                <a16:creationId xmlns:a16="http://schemas.microsoft.com/office/drawing/2014/main" id="{A1BDCBEF-DD85-4B20-BE70-04041B86FD9D}"/>
               </a:ext>
             </a:extLst>
           </p:cNvPr>
@@ -6698,56 +6703,101 @@
             <p:ph idx="1"/>
           </p:nvPr>
         </p:nvSpPr>
-        <p:spPr>
-          <a:xfrm>
-            <a:off x="278524" y="1303284"/>
-            <a:ext cx="11119945" cy="4945116"/>
-          </a:xfrm>
-        </p:spPr>
-        <p:txBody>
-          <a:bodyPr/>
-          <a:lstStyle/>
-          <a:p>
-            <a:r>
-              <a:rPr lang="en-US" dirty="0"/>
-              <a:t>A bit ahead of schedule in some portions, behind in others. This causes a lot of blocking issues that require coordination around busy schedules</a:t>
-            </a:r>
-          </a:p>
-          <a:p>
-            <a:r>
-              <a:rPr lang="en-US" dirty="0"/>
-              <a:t>Drawing on android isn’t always a linear process; performance is a major issue depending on how you implement what you’re going to draw onto</a:t>
-            </a:r>
-          </a:p>
-          <a:p>
-            <a:r>
-              <a:rPr lang="en-US" dirty="0"/>
-              <a:t>Making the app “feel” good: creating preview bitmaps for saved segments, and then drag and dropping those saved segments requires a lot of adjustments</a:t>
-            </a:r>
-          </a:p>
-          <a:p>
-            <a:r>
-              <a:rPr lang="en-US" dirty="0"/>
-              <a:t>Managing two different coordinate systems: actual screen coordinates and grid coordinates</a:t>
+        <p:spPr/>
+        <p:txBody>
+          <a:bodyPr/>
+          <a:lstStyle/>
+          <a:p>
+            <a:r>
+              <a:rPr lang="en-US" dirty="0"/>
+              <a:t>James – Miscellaneous</a:t>
             </a:r>
           </a:p>
           <a:p>
             <a:pPr lvl="1"/>
             <a:r>
               <a:rPr lang="en-US" dirty="0"/>
-              <a:t>The actual grid in charge of drawing and defining each cell’s status needs adjustments to its dimensions, otherwise we end up iterating over a 1920x1080 (or other large size) 2D array. That means each redraw would require 2,073,600 iterations. We limited the maximum dimension to be 1/15 of the normal screen size, and draw the cells larger to compensate</a:t>
+              <a:t>Added selection box drawing</a:t>
             </a:r>
           </a:p>
           <a:p>
             <a:pPr lvl="1"/>
-            <a:endParaRPr lang="en-US" dirty="0"/>
+            <a:r>
+              <a:rPr lang="en-US" dirty="0"/>
+              <a:t>Created cut/copy functions for selection box grabbing cells from grid</a:t>
+            </a:r>
+          </a:p>
+          <a:p>
+            <a:pPr lvl="1"/>
+            <a:r>
+              <a:rPr lang="en-US" dirty="0"/>
+              <a:t>Fixed a bunch of array indexing errors throughout rest of code</a:t>
+            </a:r>
+          </a:p>
+          <a:p>
+            <a:r>
+              <a:rPr lang="en-US" dirty="0"/>
+              <a:t>Kevin – Drawing and Planning</a:t>
+            </a:r>
+          </a:p>
+          <a:p>
+            <a:pPr lvl="1"/>
+            <a:r>
+              <a:rPr lang="en-US" dirty="0"/>
+              <a:t>Randomize and Paint grid drawing </a:t>
+            </a:r>
+          </a:p>
+          <a:p>
+            <a:pPr lvl="1"/>
+            <a:r>
+              <a:rPr lang="en-US" dirty="0"/>
+              <a:t>Overall simulation algorithm along with stepper and drawing functions</a:t>
+            </a:r>
+          </a:p>
+          <a:p>
+            <a:pPr lvl="1"/>
+            <a:r>
+              <a:rPr lang="en-US" dirty="0"/>
+              <a:t>Added </a:t>
+            </a:r>
+            <a:r>
+              <a:rPr lang="en-US" dirty="0" err="1"/>
+              <a:t>SerializableCellGrid</a:t>
+            </a:r>
+            <a:r>
+              <a:rPr lang="en-US" dirty="0"/>
+              <a:t> class, for converting objects representing </a:t>
+            </a:r>
+            <a:r>
+              <a:rPr lang="en-US" dirty="0" err="1"/>
+              <a:t>cellgrids</a:t>
+            </a:r>
+            <a:r>
+              <a:rPr lang="en-US" dirty="0"/>
+              <a:t> to </a:t>
+            </a:r>
+            <a:r>
+              <a:rPr lang="en-US" dirty="0" err="1"/>
+              <a:t>bytestreams</a:t>
+            </a:r>
+            <a:r>
+              <a:rPr lang="en-US" dirty="0"/>
+              <a:t> for easier database management</a:t>
+            </a:r>
+          </a:p>
+          <a:p>
+            <a:pPr lvl="1"/>
+            <a:r>
+              <a:rPr lang="en-US" dirty="0"/>
+              <a:t>General planning and coordination</a:t>
+            </a:r>
           </a:p>
         </p:txBody>
       </p:sp>
     </p:spTree>
     <p:extLst>
       <p:ext uri="{BB962C8B-B14F-4D97-AF65-F5344CB8AC3E}">
-        <p14:creationId xmlns:p14="http://schemas.microsoft.com/office/powerpoint/2010/main" val="2399929302"/>
+        <p14:creationId xmlns:p14="http://schemas.microsoft.com/office/powerpoint/2010/main" val="2818594731"/>
       </p:ext>
     </p:extLst>
   </p:cSld>
@@ -6779,7 +6829,7 @@
           <p:cNvPr id="2" name="Title 1">
             <a:extLst>
               <a:ext uri="{FF2B5EF4-FFF2-40B4-BE49-F238E27FC236}">
-                <a16:creationId xmlns:a16="http://schemas.microsoft.com/office/drawing/2014/main" id="{AB535E06-EE70-48F2-841E-ECA1902D934C}"/>
+                <a16:creationId xmlns:a16="http://schemas.microsoft.com/office/drawing/2014/main" id="{B0D1E4A0-172B-4607-9710-FDB108DF0D86}"/>
               </a:ext>
             </a:extLst>
           </p:cNvPr>
@@ -6797,7 +6847,7 @@
           <a:p>
             <a:r>
               <a:rPr lang="en-US" dirty="0"/>
-              <a:t>Roles &amp; Responsibilities</a:t>
+              <a:t>Current Challenges	</a:t>
             </a:r>
           </a:p>
         </p:txBody>
@@ -6807,7 +6857,7 @@
           <p:cNvPr id="3" name="Content Placeholder 2">
             <a:extLst>
               <a:ext uri="{FF2B5EF4-FFF2-40B4-BE49-F238E27FC236}">
-                <a16:creationId xmlns:a16="http://schemas.microsoft.com/office/drawing/2014/main" id="{A1BDCBEF-DD85-4B20-BE70-04041B86FD9D}"/>
+                <a16:creationId xmlns:a16="http://schemas.microsoft.com/office/drawing/2014/main" id="{9923A74C-6298-4F1F-B35F-5424FE296686}"/>
               </a:ext>
             </a:extLst>
           </p:cNvPr>
@@ -6818,101 +6868,56 @@
             <p:ph idx="1"/>
           </p:nvPr>
         </p:nvSpPr>
-        <p:spPr/>
-        <p:txBody>
-          <a:bodyPr/>
-          <a:lstStyle/>
-          <a:p>
-            <a:r>
-              <a:rPr lang="en-US" dirty="0"/>
-              <a:t>James – Miscellaneous</a:t>
+        <p:spPr>
+          <a:xfrm>
+            <a:off x="278524" y="1303284"/>
+            <a:ext cx="11119945" cy="4945116"/>
+          </a:xfrm>
+        </p:spPr>
+        <p:txBody>
+          <a:bodyPr/>
+          <a:lstStyle/>
+          <a:p>
+            <a:r>
+              <a:rPr lang="en-US" dirty="0"/>
+              <a:t>A bit ahead of schedule in some portions, behind in others. This causes a lot of blocking issues that require coordination around busy schedules</a:t>
+            </a:r>
+          </a:p>
+          <a:p>
+            <a:r>
+              <a:rPr lang="en-US" dirty="0"/>
+              <a:t>Drawing on android isn’t always a linear process; performance is a major issue depending on how you implement what you’re going to draw onto</a:t>
+            </a:r>
+          </a:p>
+          <a:p>
+            <a:r>
+              <a:rPr lang="en-US" dirty="0"/>
+              <a:t>Making the app “feel” good: creating preview bitmaps for saved segments, and then drag and dropping those saved segments requires a lot of adjustments</a:t>
+            </a:r>
+          </a:p>
+          <a:p>
+            <a:r>
+              <a:rPr lang="en-US" dirty="0"/>
+              <a:t>Managing two different coordinate systems: actual screen coordinates and grid coordinates</a:t>
             </a:r>
           </a:p>
           <a:p>
             <a:pPr lvl="1"/>
             <a:r>
               <a:rPr lang="en-US" dirty="0"/>
-              <a:t>Added selection box drawing</a:t>
+              <a:t>The actual grid in charge of drawing and defining each cell’s status needs adjustments to its dimensions, otherwise we end up iterating over a 1920x1080 (or other large size) 2D array. That means each redraw would require 2,073,600 iterations. We limited the maximum dimension to be 1/15 of the normal screen size, and draw the cells larger to compensate</a:t>
             </a:r>
           </a:p>
           <a:p>
             <a:pPr lvl="1"/>
-            <a:r>
-              <a:rPr lang="en-US" dirty="0"/>
-              <a:t>Created cut/copy functions for selection box grabbing cells from grid</a:t>
-            </a:r>
-          </a:p>
-          <a:p>
-            <a:pPr lvl="1"/>
-            <a:r>
-              <a:rPr lang="en-US" dirty="0"/>
-              <a:t>Fixed a bunch of array indexing errors throughout rest of code</a:t>
-            </a:r>
-          </a:p>
-          <a:p>
-            <a:r>
-              <a:rPr lang="en-US" dirty="0"/>
-              <a:t>Kevin – Drawing and Planning</a:t>
-            </a:r>
-          </a:p>
-          <a:p>
-            <a:pPr lvl="1"/>
-            <a:r>
-              <a:rPr lang="en-US" dirty="0"/>
-              <a:t>Randomize and Paint grid drawing </a:t>
-            </a:r>
-          </a:p>
-          <a:p>
-            <a:pPr lvl="1"/>
-            <a:r>
-              <a:rPr lang="en-US" dirty="0"/>
-              <a:t>Overall simulation algorithm along with stepper and drawing functions</a:t>
-            </a:r>
-          </a:p>
-          <a:p>
-            <a:pPr lvl="1"/>
-            <a:r>
-              <a:rPr lang="en-US" dirty="0"/>
-              <a:t>Added </a:t>
-            </a:r>
-            <a:r>
-              <a:rPr lang="en-US" dirty="0" err="1"/>
-              <a:t>SerializableCellGrid</a:t>
-            </a:r>
-            <a:r>
-              <a:rPr lang="en-US" dirty="0"/>
-              <a:t> class, for converting objects representing </a:t>
-            </a:r>
-            <a:r>
-              <a:rPr lang="en-US" dirty="0" err="1"/>
-              <a:t>cellgrids</a:t>
-            </a:r>
-            <a:r>
-              <a:rPr lang="en-US" dirty="0"/>
-              <a:t> to </a:t>
-            </a:r>
-            <a:r>
-              <a:rPr lang="en-US" dirty="0" err="1"/>
-              <a:t>bytestreams</a:t>
-            </a:r>
-            <a:r>
-              <a:rPr lang="en-US" dirty="0"/>
-              <a:t> for easier database management</a:t>
-            </a:r>
-          </a:p>
-          <a:p>
-            <a:pPr lvl="1"/>
-            <a:r>
-              <a:rPr lang="en-US" dirty="0"/>
-              <a:t>General planning and coordination</a:t>
-            </a:r>
+            <a:endParaRPr lang="en-US" dirty="0"/>
           </a:p>
         </p:txBody>
       </p:sp>
     </p:spTree>
     <p:extLst>
       <p:ext uri="{BB962C8B-B14F-4D97-AF65-F5344CB8AC3E}">
-        <p14:creationId xmlns:p14="http://schemas.microsoft.com/office/powerpoint/2010/main" val="2818594731"/>
+        <p14:creationId xmlns:p14="http://schemas.microsoft.com/office/powerpoint/2010/main" val="2399929302"/>
       </p:ext>
     </p:extLst>
   </p:cSld>

</xml_diff>